<commit_message>
updating solver, applied to fontan and alternative procedures
</commit_message>
<xml_diff>
--- a/administrative/BMED 4699, Mahdi Al-Husseini.pptx
+++ b/administrative/BMED 4699, Mahdi Al-Husseini.pptx
@@ -9,7 +9,8 @@
     <p:sldId id="261" r:id="rId3"/>
     <p:sldId id="257" r:id="rId4"/>
     <p:sldId id="258" r:id="rId5"/>
-    <p:sldId id="260" r:id="rId6"/>
+    <p:sldId id="262" r:id="rId6"/>
+    <p:sldId id="260" r:id="rId7"/>
   </p:sldIdLst>
   <p:sldSz cx="12192000" cy="6858000"/>
   <p:notesSz cx="6858000" cy="9144000"/>
@@ -306,7 +307,7 @@
             <a:fld id="{8E36636D-D922-432D-A958-524484B5923D}" type="datetimeFigureOut">
               <a:rPr lang="en-US" dirty="0"/>
               <a:pPr/>
-              <a:t>12/5/2017</a:t>
+              <a:t>12/6/2017</a:t>
             </a:fld>
             <a:endParaRPr lang="en-US" dirty="0"/>
           </a:p>
@@ -600,7 +601,7 @@
           <a:p>
             <a:fld id="{48A87A34-81AB-432B-8DAE-1953F412C126}" type="datetimeFigureOut">
               <a:rPr lang="en-US" dirty="0"/>
-              <a:t>12/5/2017</a:t>
+              <a:t>12/6/2017</a:t>
             </a:fld>
             <a:endParaRPr lang="en-US" dirty="0"/>
           </a:p>
@@ -787,7 +788,7 @@
           <a:p>
             <a:fld id="{48A87A34-81AB-432B-8DAE-1953F412C126}" type="datetimeFigureOut">
               <a:rPr lang="en-US" dirty="0"/>
-              <a:t>12/5/2017</a:t>
+              <a:t>12/6/2017</a:t>
             </a:fld>
             <a:endParaRPr lang="en-US" dirty="0"/>
           </a:p>
@@ -1043,7 +1044,7 @@
           <a:p>
             <a:fld id="{48A87A34-81AB-432B-8DAE-1953F412C126}" type="datetimeFigureOut">
               <a:rPr lang="en-US" dirty="0"/>
-              <a:t>12/5/2017</a:t>
+              <a:t>12/6/2017</a:t>
             </a:fld>
             <a:endParaRPr lang="en-US" dirty="0"/>
           </a:p>
@@ -1462,7 +1463,7 @@
           <a:p>
             <a:fld id="{48A87A34-81AB-432B-8DAE-1953F412C126}" type="datetimeFigureOut">
               <a:rPr lang="en-US" dirty="0"/>
-              <a:t>12/5/2017</a:t>
+              <a:t>12/6/2017</a:t>
             </a:fld>
             <a:endParaRPr lang="en-US" dirty="0"/>
           </a:p>
@@ -1994,7 +1995,7 @@
           <a:p>
             <a:fld id="{48A87A34-81AB-432B-8DAE-1953F412C126}" type="datetimeFigureOut">
               <a:rPr lang="en-US" dirty="0"/>
-              <a:t>12/5/2017</a:t>
+              <a:t>12/6/2017</a:t>
             </a:fld>
             <a:endParaRPr lang="en-US" dirty="0"/>
           </a:p>
@@ -2853,7 +2854,7 @@
           <a:p>
             <a:fld id="{48A87A34-81AB-432B-8DAE-1953F412C126}" type="datetimeFigureOut">
               <a:rPr lang="en-US" dirty="0"/>
-              <a:t>12/5/2017</a:t>
+              <a:t>12/6/2017</a:t>
             </a:fld>
             <a:endParaRPr lang="en-US" dirty="0"/>
           </a:p>
@@ -3019,7 +3020,7 @@
             <a:fld id="{8E36636D-D922-432D-A958-524484B5923D}" type="datetimeFigureOut">
               <a:rPr lang="en-US" dirty="0"/>
               <a:pPr/>
-              <a:t>12/5/2017</a:t>
+              <a:t>12/6/2017</a:t>
             </a:fld>
             <a:endParaRPr lang="en-US" dirty="0"/>
           </a:p>
@@ -3200,7 +3201,7 @@
             <a:fld id="{8E36636D-D922-432D-A958-524484B5923D}" type="datetimeFigureOut">
               <a:rPr lang="en-US" dirty="0"/>
               <a:pPr/>
-              <a:t>12/5/2017</a:t>
+              <a:t>12/6/2017</a:t>
             </a:fld>
             <a:endParaRPr lang="en-US" dirty="0"/>
           </a:p>
@@ -3367,7 +3368,7 @@
             <a:fld id="{8E36636D-D922-432D-A958-524484B5923D}" type="datetimeFigureOut">
               <a:rPr lang="en-US" dirty="0"/>
               <a:pPr/>
-              <a:t>12/5/2017</a:t>
+              <a:t>12/6/2017</a:t>
             </a:fld>
             <a:endParaRPr lang="en-US" dirty="0"/>
           </a:p>
@@ -3608,7 +3609,7 @@
             <a:fld id="{8E36636D-D922-432D-A958-524484B5923D}" type="datetimeFigureOut">
               <a:rPr lang="en-US" dirty="0"/>
               <a:pPr/>
-              <a:t>12/5/2017</a:t>
+              <a:t>12/6/2017</a:t>
             </a:fld>
             <a:endParaRPr lang="en-US" dirty="0"/>
           </a:p>
@@ -3841,7 +3842,7 @@
             <a:fld id="{8E36636D-D922-432D-A958-524484B5923D}" type="datetimeFigureOut">
               <a:rPr lang="en-US" dirty="0"/>
               <a:pPr/>
-              <a:t>12/5/2017</a:t>
+              <a:t>12/6/2017</a:t>
             </a:fld>
             <a:endParaRPr lang="en-US" dirty="0"/>
           </a:p>
@@ -4304,7 +4305,7 @@
             <a:fld id="{8E36636D-D922-432D-A958-524484B5923D}" type="datetimeFigureOut">
               <a:rPr lang="en-US" dirty="0"/>
               <a:pPr/>
-              <a:t>12/5/2017</a:t>
+              <a:t>12/6/2017</a:t>
             </a:fld>
             <a:endParaRPr lang="en-US" dirty="0"/>
           </a:p>
@@ -4419,7 +4420,7 @@
             <a:fld id="{8E36636D-D922-432D-A958-524484B5923D}" type="datetimeFigureOut">
               <a:rPr lang="en-US" dirty="0"/>
               <a:pPr/>
-              <a:t>12/5/2017</a:t>
+              <a:t>12/6/2017</a:t>
             </a:fld>
             <a:endParaRPr lang="en-US" dirty="0"/>
           </a:p>
@@ -4511,7 +4512,7 @@
             <a:fld id="{8E36636D-D922-432D-A958-524484B5923D}" type="datetimeFigureOut">
               <a:rPr lang="en-US" dirty="0"/>
               <a:pPr/>
-              <a:t>12/5/2017</a:t>
+              <a:t>12/6/2017</a:t>
             </a:fld>
             <a:endParaRPr lang="en-US" dirty="0"/>
           </a:p>
@@ -4763,7 +4764,7 @@
             <a:fld id="{8E36636D-D922-432D-A958-524484B5923D}" type="datetimeFigureOut">
               <a:rPr lang="en-US" dirty="0"/>
               <a:pPr/>
-              <a:t>12/5/2017</a:t>
+              <a:t>12/6/2017</a:t>
             </a:fld>
             <a:endParaRPr lang="en-US" dirty="0"/>
           </a:p>
@@ -5060,7 +5061,7 @@
             <a:fld id="{8E36636D-D922-432D-A958-524484B5923D}" type="datetimeFigureOut">
               <a:rPr lang="en-US" dirty="0"/>
               <a:pPr/>
-              <a:t>12/5/2017</a:t>
+              <a:t>12/6/2017</a:t>
             </a:fld>
             <a:endParaRPr lang="en-US" dirty="0"/>
           </a:p>
@@ -5291,7 +5292,7 @@
             <a:fld id="{8E36636D-D922-432D-A958-524484B5923D}" type="datetimeFigureOut">
               <a:rPr lang="en-US" dirty="0"/>
               <a:pPr/>
-              <a:t>12/5/2017</a:t>
+              <a:t>12/6/2017</a:t>
             </a:fld>
             <a:endParaRPr lang="en-US" dirty="0"/>
           </a:p>
@@ -5988,6 +5989,25 @@
               <a:rPr lang="en-US" sz="5000" dirty="0"/>
               <a:t>BMED 4699, Mahdi Al-Husseini</a:t>
             </a:r>
+            <a:br>
+              <a:rPr lang="en-US" sz="5000" dirty="0"/>
+            </a:br>
+            <a:r>
+              <a:rPr lang="en-US" sz="2200" dirty="0"/>
+              <a:t>Simulating </a:t>
+            </a:r>
+            <a:r>
+              <a:rPr lang="en-US" sz="2200" dirty="0">
+                <a:solidFill>
+                  <a:srgbClr val="FF0000"/>
+                </a:solidFill>
+              </a:rPr>
+              <a:t>Blood Flow </a:t>
+            </a:r>
+            <a:r>
+              <a:rPr lang="en-US" sz="2200" dirty="0"/>
+              <a:t>through a Hypothetical Modified Fontan Procedure</a:t>
+            </a:r>
           </a:p>
         </p:txBody>
       </p:sp>
@@ -6009,7 +6029,7 @@
         </p:nvSpPr>
         <p:spPr>
           <a:xfrm>
-            <a:off x="1370693" y="3598339"/>
+            <a:off x="1370693" y="5306559"/>
             <a:ext cx="9440034" cy="506413"/>
           </a:xfrm>
         </p:spPr>
@@ -6023,7 +6043,7 @@
             </a:r>
             <a:r>
               <a:rPr lang="en-US" baseline="30000" dirty="0"/>
-              <a:t>2</a:t>
+              <a:t>2 </a:t>
             </a:r>
             <a:endParaRPr lang="en-US" dirty="0"/>
           </a:p>
@@ -6112,17 +6132,17 @@
           <a:p>
             <a:r>
               <a:rPr lang="en-US" dirty="0"/>
-              <a:t>Develop a Fundamental Understanding of Finite Element Methods and Review Navier-Stokes Formulations</a:t>
+              <a:t>Develop a Fundamental Understanding of Finite Element Methods (FEM) and Review Navier-Stokes Formulations for FEM</a:t>
             </a:r>
           </a:p>
           <a:p>
             <a:r>
               <a:rPr lang="en-US" dirty="0"/>
-              <a:t>Develop MATLAB Pre-Processor and Processor Files that take in Patient Specific IVC/SVC/PA Measurements from Dr. Anthony </a:t>
+              <a:t>Develop MATLAB Pre-Processor and Processor Files that take Patient Specific IVC/SVC/PA Measurements from Dr. Anthony </a:t>
             </a:r>
             <a:r>
               <a:rPr lang="en-US" dirty="0" err="1"/>
-              <a:t>Corto</a:t>
+              <a:t>Corno</a:t>
             </a:r>
             <a:r>
               <a:rPr lang="en-US" dirty="0"/>
@@ -6208,14 +6228,19 @@
         <p:spPr/>
         <p:txBody>
           <a:bodyPr>
-            <a:normAutofit/>
+            <a:normAutofit fontScale="90000"/>
           </a:bodyPr>
           <a:lstStyle/>
           <a:p>
             <a:r>
               <a:rPr lang="en-US" sz="3500" dirty="0"/>
-              <a:t>CONSTRUCTIVE GEOMETRY MESH FILES</a:t>
-            </a:r>
+              <a:t>Constructive Geometry Mesh Files developed in MATLAB and visualized in </a:t>
+            </a:r>
+            <a:r>
+              <a:rPr lang="en-US" sz="3500" dirty="0" err="1"/>
+              <a:t>NetGen</a:t>
+            </a:r>
+            <a:endParaRPr lang="en-US" sz="3500" dirty="0"/>
           </a:p>
         </p:txBody>
       </p:sp>
@@ -6241,7 +6266,7 @@
         </p:blipFill>
         <p:spPr>
           <a:xfrm>
-            <a:off x="342365" y="2562387"/>
+            <a:off x="5762089" y="2489634"/>
             <a:ext cx="6229860" cy="4152164"/>
           </a:xfrm>
           <a:prstGeom prst="rect">
@@ -6271,7 +6296,7 @@
         </p:blipFill>
         <p:spPr>
           <a:xfrm>
-            <a:off x="5677548" y="2562387"/>
+            <a:off x="216837" y="2490648"/>
             <a:ext cx="6220219" cy="4152165"/>
           </a:xfrm>
           <a:prstGeom prst="rect">
@@ -6295,7 +6320,7 @@
         </p:nvSpPr>
         <p:spPr>
           <a:xfrm>
-            <a:off x="8157275" y="1867545"/>
+            <a:off x="1490194" y="1891602"/>
             <a:ext cx="2314414" cy="607017"/>
           </a:xfrm>
           <a:prstGeom prst="rect">
@@ -6425,8 +6450,8 @@
         </p:nvSpPr>
         <p:spPr>
           <a:xfrm>
-            <a:off x="1800387" y="1867544"/>
-            <a:ext cx="2314414" cy="607017"/>
+            <a:off x="7507850" y="1897535"/>
+            <a:ext cx="3525241" cy="607017"/>
           </a:xfrm>
           <a:prstGeom prst="rect">
             <a:avLst/>
@@ -6441,7 +6466,7 @@
         </p:spPr>
         <p:txBody>
           <a:bodyPr vert="horz" lIns="91440" tIns="45720" rIns="91440" bIns="45720" rtlCol="0" anchor="ctr">
-            <a:normAutofit fontScale="92500" lnSpcReduction="10000"/>
+            <a:normAutofit fontScale="85000" lnSpcReduction="10000"/>
           </a:bodyPr>
           <a:lstStyle>
             <a:lvl1pPr algn="ctr" defTabSz="457200" rtl="0" eaLnBrk="1" latinLnBrk="0" hangingPunct="1">
@@ -6534,7 +6559,7 @@
           <a:p>
             <a:r>
               <a:rPr lang="en-US" dirty="0"/>
-              <a:t>Modified</a:t>
+              <a:t>Modified Fontan</a:t>
             </a:r>
           </a:p>
         </p:txBody>
@@ -6597,28 +6622,97 @@
           </a:p>
         </p:txBody>
       </p:sp>
-      <p:sp>
-        <p:nvSpPr>
-          <p:cNvPr id="3" name="Content Placeholder 2">
+      <p:pic>
+        <p:nvPicPr>
+          <p:cNvPr id="5" name="Picture 4">
             <a:extLst>
               <a:ext uri="{FF2B5EF4-FFF2-40B4-BE49-F238E27FC236}">
-                <a16:creationId xmlns:a16="http://schemas.microsoft.com/office/drawing/2014/main" id="{1E301B2C-41F3-40AE-A384-C0491FE7B627}"/>
+                <a16:creationId xmlns:a16="http://schemas.microsoft.com/office/drawing/2014/main" id="{36879C1A-4CFF-49DB-B8B3-0E2071FA0559}"/>
               </a:ext>
             </a:extLst>
           </p:cNvPr>
-          <p:cNvSpPr>
-            <a:spLocks noGrp="1"/>
-          </p:cNvSpPr>
-          <p:nvPr>
-            <p:ph idx="1"/>
-          </p:nvPr>
-        </p:nvSpPr>
-        <p:spPr/>
-        <p:txBody>
-          <a:bodyPr/>
-          <a:lstStyle/>
-          <a:p>
-            <a:endParaRPr lang="en-US"/>
+          <p:cNvPicPr>
+            <a:picLocks noChangeAspect="1"/>
+          </p:cNvPicPr>
+          <p:nvPr/>
+        </p:nvPicPr>
+        <p:blipFill>
+          <a:blip r:embed="rId2"/>
+          <a:stretch>
+            <a:fillRect/>
+          </a:stretch>
+        </p:blipFill>
+        <p:spPr>
+          <a:xfrm>
+            <a:off x="3021659" y="1580050"/>
+            <a:ext cx="5475444" cy="4355207"/>
+          </a:xfrm>
+          <a:prstGeom prst="rect">
+            <a:avLst/>
+          </a:prstGeom>
+        </p:spPr>
+      </p:pic>
+      <p:sp>
+        <p:nvSpPr>
+          <p:cNvPr id="6" name="TextBox 5">
+            <a:extLst>
+              <a:ext uri="{FF2B5EF4-FFF2-40B4-BE49-F238E27FC236}">
+                <a16:creationId xmlns:a16="http://schemas.microsoft.com/office/drawing/2014/main" id="{8FB18154-6403-4A91-B892-1E33BB29E39F}"/>
+              </a:ext>
+            </a:extLst>
+          </p:cNvPr>
+          <p:cNvSpPr txBox="1"/>
+          <p:nvPr/>
+        </p:nvSpPr>
+        <p:spPr>
+          <a:xfrm>
+            <a:off x="5354097" y="6304002"/>
+            <a:ext cx="6837903" cy="553998"/>
+          </a:xfrm>
+          <a:prstGeom prst="rect">
+            <a:avLst/>
+          </a:prstGeom>
+          <a:noFill/>
+        </p:spPr>
+        <p:txBody>
+          <a:bodyPr wrap="square" rtlCol="0">
+            <a:spAutoFit/>
+          </a:bodyPr>
+          <a:lstStyle/>
+          <a:p>
+            <a:pPr algn="r"/>
+            <a:r>
+              <a:rPr lang="en-US" sz="1000" dirty="0" err="1"/>
+              <a:t>Troianowski</a:t>
+            </a:r>
+            <a:r>
+              <a:rPr lang="en-US" sz="1000" dirty="0"/>
+              <a:t>, G., Taylor, C. A., Feinstein, J. A., &amp; </a:t>
+            </a:r>
+            <a:r>
+              <a:rPr lang="en-US" sz="1000" dirty="0" err="1"/>
+              <a:t>Vignon-Clementel</a:t>
+            </a:r>
+            <a:r>
+              <a:rPr lang="en-US" sz="1000" dirty="0"/>
+              <a:t>, I. E. (2011). Three-dimensional simulations in Glenn patients: clinically based boundary conditions, hemodynamic results and sensitivity to input data. </a:t>
+            </a:r>
+            <a:r>
+              <a:rPr lang="en-US" sz="1000" i="1" dirty="0"/>
+              <a:t>Journal of biomechanical engineering</a:t>
+            </a:r>
+            <a:r>
+              <a:rPr lang="en-US" sz="1000" dirty="0"/>
+              <a:t>, </a:t>
+            </a:r>
+            <a:r>
+              <a:rPr lang="en-US" sz="1000" i="1" dirty="0"/>
+              <a:t>133</a:t>
+            </a:r>
+            <a:r>
+              <a:rPr lang="en-US" sz="1000" dirty="0"/>
+              <a:t>(11), 111006.</a:t>
+            </a:r>
           </a:p>
         </p:txBody>
       </p:sp>
@@ -6657,6 +6751,94 @@
           <p:cNvPr id="2" name="Title 1">
             <a:extLst>
               <a:ext uri="{FF2B5EF4-FFF2-40B4-BE49-F238E27FC236}">
+                <a16:creationId xmlns:a16="http://schemas.microsoft.com/office/drawing/2014/main" id="{71E9B671-CDD5-4774-855F-02AF59C911EB}"/>
+              </a:ext>
+            </a:extLst>
+          </p:cNvPr>
+          <p:cNvSpPr>
+            <a:spLocks noGrp="1"/>
+          </p:cNvSpPr>
+          <p:nvPr>
+            <p:ph type="title"/>
+          </p:nvPr>
+        </p:nvSpPr>
+        <p:spPr/>
+        <p:txBody>
+          <a:bodyPr/>
+          <a:lstStyle/>
+          <a:p>
+            <a:r>
+              <a:rPr lang="en-US" dirty="0"/>
+              <a:t>Finite Element Treatment of Navier Stokes</a:t>
+            </a:r>
+          </a:p>
+        </p:txBody>
+      </p:sp>
+      <p:pic>
+        <p:nvPicPr>
+          <p:cNvPr id="5" name="Picture 4">
+            <a:extLst>
+              <a:ext uri="{FF2B5EF4-FFF2-40B4-BE49-F238E27FC236}">
+                <a16:creationId xmlns:a16="http://schemas.microsoft.com/office/drawing/2014/main" id="{C0595D1F-5C34-41D0-9ED2-9686B7FBE847}"/>
+              </a:ext>
+            </a:extLst>
+          </p:cNvPr>
+          <p:cNvPicPr>
+            <a:picLocks noChangeAspect="1"/>
+          </p:cNvPicPr>
+          <p:nvPr/>
+        </p:nvPicPr>
+        <p:blipFill>
+          <a:blip r:embed="rId2"/>
+          <a:stretch>
+            <a:fillRect/>
+          </a:stretch>
+        </p:blipFill>
+        <p:spPr>
+          <a:xfrm>
+            <a:off x="3018393" y="1931589"/>
+            <a:ext cx="6144566" cy="3497068"/>
+          </a:xfrm>
+          <a:prstGeom prst="rect">
+            <a:avLst/>
+          </a:prstGeom>
+        </p:spPr>
+      </p:pic>
+    </p:spTree>
+    <p:extLst>
+      <p:ext uri="{BB962C8B-B14F-4D97-AF65-F5344CB8AC3E}">
+        <p14:creationId xmlns:p14="http://schemas.microsoft.com/office/powerpoint/2010/main" val="4121564204"/>
+      </p:ext>
+    </p:extLst>
+  </p:cSld>
+  <p:clrMapOvr>
+    <a:masterClrMapping/>
+  </p:clrMapOvr>
+</p:sld>
+</file>
+
+<file path=ppt/slides/slide6.xml><?xml version="1.0" encoding="utf-8"?>
+<p:sld xmlns:a="http://schemas.openxmlformats.org/drawingml/2006/main" xmlns:r="http://schemas.openxmlformats.org/officeDocument/2006/relationships" xmlns:p="http://schemas.openxmlformats.org/presentationml/2006/main">
+  <p:cSld>
+    <p:spTree>
+      <p:nvGrpSpPr>
+        <p:cNvPr id="1" name=""/>
+        <p:cNvGrpSpPr/>
+        <p:nvPr/>
+      </p:nvGrpSpPr>
+      <p:grpSpPr>
+        <a:xfrm>
+          <a:off x="0" y="0"/>
+          <a:ext cx="0" cy="0"/>
+          <a:chOff x="0" y="0"/>
+          <a:chExt cx="0" cy="0"/>
+        </a:xfrm>
+      </p:grpSpPr>
+      <p:sp>
+        <p:nvSpPr>
+          <p:cNvPr id="2" name="Title 1">
+            <a:extLst>
+              <a:ext uri="{FF2B5EF4-FFF2-40B4-BE49-F238E27FC236}">
                 <a16:creationId xmlns:a16="http://schemas.microsoft.com/office/drawing/2014/main" id="{B0792043-4A7E-4DCC-B771-86CCBCA2BDE6}"/>
               </a:ext>
             </a:extLst>
@@ -6675,7 +6857,7 @@
           <a:p>
             <a:r>
               <a:rPr lang="en-US" dirty="0"/>
-              <a:t>Spring Semester Plan</a:t>
+              <a:t>Spring Semester Plan (Looking Forwards)</a:t>
             </a:r>
           </a:p>
         </p:txBody>

</xml_diff>